<commit_message>
Licence update to Supplementaries
</commit_message>
<xml_diff>
--- a/Supplementaries/Supp1-VersionControl.pptx
+++ b/Supplementaries/Supp1-VersionControl.pptx
@@ -297,7 +297,7 @@
           <a:p>
             <a:fld id="{DB44D3C2-DE9E-4880-8F88-8211D21A37AD}" type="datetimeFigureOut">
               <a:rPr lang="en-GB" smtClean="0"/>
-              <a:t>18/09/2013</a:t>
+              <a:t>12/02/2015</a:t>
             </a:fld>
             <a:endParaRPr lang="en-GB"/>
           </a:p>
@@ -467,7 +467,7 @@
           <a:p>
             <a:fld id="{DB44D3C2-DE9E-4880-8F88-8211D21A37AD}" type="datetimeFigureOut">
               <a:rPr lang="en-GB" smtClean="0"/>
-              <a:t>18/09/2013</a:t>
+              <a:t>12/02/2015</a:t>
             </a:fld>
             <a:endParaRPr lang="en-GB"/>
           </a:p>
@@ -647,7 +647,7 @@
           <a:p>
             <a:fld id="{DB44D3C2-DE9E-4880-8F88-8211D21A37AD}" type="datetimeFigureOut">
               <a:rPr lang="en-GB" smtClean="0"/>
-              <a:t>18/09/2013</a:t>
+              <a:t>12/02/2015</a:t>
             </a:fld>
             <a:endParaRPr lang="en-GB"/>
           </a:p>
@@ -817,7 +817,7 @@
           <a:p>
             <a:fld id="{DB44D3C2-DE9E-4880-8F88-8211D21A37AD}" type="datetimeFigureOut">
               <a:rPr lang="en-GB" smtClean="0"/>
-              <a:t>18/09/2013</a:t>
+              <a:t>12/02/2015</a:t>
             </a:fld>
             <a:endParaRPr lang="en-GB"/>
           </a:p>
@@ -1063,7 +1063,7 @@
           <a:p>
             <a:fld id="{DB44D3C2-DE9E-4880-8F88-8211D21A37AD}" type="datetimeFigureOut">
               <a:rPr lang="en-GB" smtClean="0"/>
-              <a:t>18/09/2013</a:t>
+              <a:t>12/02/2015</a:t>
             </a:fld>
             <a:endParaRPr lang="en-GB"/>
           </a:p>
@@ -1351,7 +1351,7 @@
           <a:p>
             <a:fld id="{DB44D3C2-DE9E-4880-8F88-8211D21A37AD}" type="datetimeFigureOut">
               <a:rPr lang="en-GB" smtClean="0"/>
-              <a:t>18/09/2013</a:t>
+              <a:t>12/02/2015</a:t>
             </a:fld>
             <a:endParaRPr lang="en-GB"/>
           </a:p>
@@ -1773,7 +1773,7 @@
           <a:p>
             <a:fld id="{DB44D3C2-DE9E-4880-8F88-8211D21A37AD}" type="datetimeFigureOut">
               <a:rPr lang="en-GB" smtClean="0"/>
-              <a:t>18/09/2013</a:t>
+              <a:t>12/02/2015</a:t>
             </a:fld>
             <a:endParaRPr lang="en-GB"/>
           </a:p>
@@ -1891,7 +1891,7 @@
           <a:p>
             <a:fld id="{DB44D3C2-DE9E-4880-8F88-8211D21A37AD}" type="datetimeFigureOut">
               <a:rPr lang="en-GB" smtClean="0"/>
-              <a:t>18/09/2013</a:t>
+              <a:t>12/02/2015</a:t>
             </a:fld>
             <a:endParaRPr lang="en-GB"/>
           </a:p>
@@ -1986,7 +1986,7 @@
           <a:p>
             <a:fld id="{DB44D3C2-DE9E-4880-8F88-8211D21A37AD}" type="datetimeFigureOut">
               <a:rPr lang="en-GB" smtClean="0"/>
-              <a:t>18/09/2013</a:t>
+              <a:t>12/02/2015</a:t>
             </a:fld>
             <a:endParaRPr lang="en-GB"/>
           </a:p>
@@ -2263,7 +2263,7 @@
           <a:p>
             <a:fld id="{DB44D3C2-DE9E-4880-8F88-8211D21A37AD}" type="datetimeFigureOut">
               <a:rPr lang="en-GB" smtClean="0"/>
-              <a:t>18/09/2013</a:t>
+              <a:t>12/02/2015</a:t>
             </a:fld>
             <a:endParaRPr lang="en-GB"/>
           </a:p>
@@ -2516,7 +2516,7 @@
           <a:p>
             <a:fld id="{DB44D3C2-DE9E-4880-8F88-8211D21A37AD}" type="datetimeFigureOut">
               <a:rPr lang="en-GB" smtClean="0"/>
-              <a:t>18/09/2013</a:t>
+              <a:t>12/02/2015</a:t>
             </a:fld>
             <a:endParaRPr lang="en-GB"/>
           </a:p>
@@ -2729,7 +2729,7 @@
           <a:p>
             <a:fld id="{DB44D3C2-DE9E-4880-8F88-8211D21A37AD}" type="datetimeFigureOut">
               <a:rPr lang="en-GB" smtClean="0"/>
-              <a:t>18/09/2013</a:t>
+              <a:t>12/02/2015</a:t>
             </a:fld>
             <a:endParaRPr lang="en-GB"/>
           </a:p>
@@ -3326,11 +3326,7 @@
                 <a:latin typeface="Kozuka Gothic Pr6N B" pitchFamily="34" charset="-128"/>
                 <a:ea typeface="Kozuka Gothic Pr6N B" pitchFamily="34" charset="-128"/>
               </a:rPr>
-              <a:t> Presentation slides </a:t>
-            </a:r>
-            <a:r>
-              <a:rPr lang="en-GB" dirty="0" smtClean="0"/>
-              <a:t>© </a:t>
+              <a:t> Presentation </a:t>
             </a:r>
             <a:r>
               <a:rPr lang="en-GB" sz="1700" dirty="0" smtClean="0">
@@ -3344,7 +3340,49 @@
                 <a:latin typeface="Kozuka Gothic Pr6N B" pitchFamily="34" charset="-128"/>
                 <a:ea typeface="Kozuka Gothic Pr6N B" pitchFamily="34" charset="-128"/>
               </a:rPr>
-              <a:t>Sophie  Kay 2012 , CC-BY-3.0.</a:t>
+              <a:t>slides authored by Sophie  Kay, 2013 (rev. 2015) </a:t>
+            </a:r>
+            <a:r>
+              <a:rPr lang="en-GB" sz="1700" dirty="0" smtClean="0">
+                <a:effectLst>
+                  <a:outerShdw blurRad="50800" dist="38100" dir="8100000" algn="tr" rotWithShape="0">
+                    <a:prstClr val="black">
+                      <a:alpha val="40000"/>
+                    </a:prstClr>
+                  </a:outerShdw>
+                </a:effectLst>
+                <a:latin typeface="Kozuka Gothic Pr6N B" pitchFamily="34" charset="-128"/>
+                <a:ea typeface="Kozuka Gothic Pr6N B" pitchFamily="34" charset="-128"/>
+              </a:rPr>
+              <a:t>, </a:t>
+            </a:r>
+            <a:r>
+              <a:rPr lang="en-GB" sz="1700" dirty="0" smtClean="0">
+                <a:effectLst>
+                  <a:outerShdw blurRad="50800" dist="38100" dir="8100000" algn="tr" rotWithShape="0">
+                    <a:prstClr val="black">
+                      <a:alpha val="40000"/>
+                    </a:prstClr>
+                  </a:outerShdw>
+                </a:effectLst>
+                <a:latin typeface="Kozuka Gothic Pr6N B" pitchFamily="34" charset="-128"/>
+                <a:ea typeface="Kozuka Gothic Pr6N B" pitchFamily="34" charset="-128"/>
+              </a:rPr>
+              <a:t>CC-BY-4.0</a:t>
+            </a:r>
+            <a:r>
+              <a:rPr lang="en-GB" sz="1700" dirty="0" smtClean="0">
+                <a:effectLst>
+                  <a:outerShdw blurRad="50800" dist="38100" dir="8100000" algn="tr" rotWithShape="0">
+                    <a:prstClr val="black">
+                      <a:alpha val="40000"/>
+                    </a:prstClr>
+                  </a:outerShdw>
+                </a:effectLst>
+                <a:latin typeface="Kozuka Gothic Pr6N B" pitchFamily="34" charset="-128"/>
+                <a:ea typeface="Kozuka Gothic Pr6N B" pitchFamily="34" charset="-128"/>
+              </a:rPr>
+              <a:t>.</a:t>
             </a:r>
           </a:p>
           <a:p>
@@ -3388,7 +3426,21 @@
                 <a:latin typeface="Kozuka Gothic Pr6N B" pitchFamily="34" charset="-128"/>
                 <a:ea typeface="Kozuka Gothic Pr6N B" pitchFamily="34" charset="-128"/>
               </a:rPr>
-              <a:t>http://creativecommons.org/licenses/by/3.0/ </a:t>
+              <a:t>http://</a:t>
+            </a:r>
+            <a:r>
+              <a:rPr lang="en-GB" sz="1700" dirty="0" smtClean="0">
+                <a:latin typeface="Kozuka Gothic Pr6N B" pitchFamily="34" charset="-128"/>
+                <a:ea typeface="Kozuka Gothic Pr6N B" pitchFamily="34" charset="-128"/>
+              </a:rPr>
+              <a:t>creativecommons.org/licenses/by/4.0</a:t>
+            </a:r>
+            <a:r>
+              <a:rPr lang="en-GB" sz="1700" dirty="0" smtClean="0">
+                <a:latin typeface="Kozuka Gothic Pr6N B" pitchFamily="34" charset="-128"/>
+                <a:ea typeface="Kozuka Gothic Pr6N B" pitchFamily="34" charset="-128"/>
+              </a:rPr>
+              <a:t>/ </a:t>
             </a:r>
             <a:r>
               <a:rPr lang="en-GB" sz="1700" dirty="0" smtClean="0">
@@ -5504,7 +5556,7 @@
         <p:spPr>
           <a:xfrm>
             <a:off x="899592" y="980728"/>
-            <a:ext cx="5904656" cy="646331"/>
+            <a:ext cx="5904656" cy="923330"/>
           </a:xfrm>
           <a:prstGeom prst="rect">
             <a:avLst/>
@@ -5518,7 +5570,11 @@
           <a:p>
             <a:r>
               <a:rPr lang="en-GB" dirty="0" smtClean="0"/>
-              <a:t>Embed YouTube video here, from the following address:</a:t>
+              <a:t>Users of these slides should embed the YouTube video, “What Is VCS?” </a:t>
+            </a:r>
+            <a:r>
+              <a:rPr lang="en-GB" dirty="0" smtClean="0"/>
+              <a:t>here, from the following address:</a:t>
             </a:r>
           </a:p>
           <a:p>
@@ -8195,7 +8251,7 @@
           </p:cNvPicPr>
           <p:nvPr/>
         </p:nvPicPr>
-        <p:blipFill>
+        <p:blipFill rotWithShape="1">
           <a:blip r:embed="rId2">
             <a:extLst>
               <a:ext uri="{28A0092B-C50C-407E-A947-70E740481C1C}">
@@ -8203,15 +8259,13 @@
               </a:ext>
             </a:extLst>
           </a:blip>
-          <a:srcRect/>
-          <a:stretch>
-            <a:fillRect/>
-          </a:stretch>
+          <a:srcRect t="4045"/>
+          <a:stretch/>
         </p:blipFill>
         <p:spPr bwMode="auto">
           <a:xfrm>
-            <a:off x="179512" y="260648"/>
-            <a:ext cx="8640960" cy="4858168"/>
+            <a:off x="179512" y="457200"/>
+            <a:ext cx="8640960" cy="4661616"/>
           </a:xfrm>
           <a:prstGeom prst="rect">
             <a:avLst/>

</xml_diff>